<commit_message>
Apresentações E Manual Usuario
</commit_message>
<xml_diff>
--- a/Equipe04_DiegoPamplona_AuditCO/2018-06-25 a 2018-06-29 rodada de demonstracao/AuditCO – Auditoria e Compliance de Softwares.pptx
+++ b/Equipe04_DiegoPamplona_AuditCO/2018-06-25 a 2018-06-29 rodada de demonstracao/AuditCO – Auditoria e Compliance de Softwares.pptx
@@ -8,7 +8,8 @@
     <p:sldId id="256" r:id="rId2"/>
     <p:sldId id="257" r:id="rId3"/>
     <p:sldId id="258" r:id="rId4"/>
-    <p:sldId id="259" r:id="rId5"/>
+    <p:sldId id="260" r:id="rId5"/>
+    <p:sldId id="259" r:id="rId6"/>
   </p:sldIdLst>
   <p:sldSz cx="12192000" cy="6858000"/>
   <p:notesSz cx="6858000" cy="9144000"/>
@@ -107,6 +108,11 @@
       </a:defRPr>
     </a:lvl9pPr>
   </p:defaultTextStyle>
+  <p:extLst>
+    <p:ext uri="{EFAFB233-063F-42B5-8137-9DF3F51BA10A}">
+      <p15:sldGuideLst xmlns:p15="http://schemas.microsoft.com/office/powerpoint/2012/main"/>
+    </p:ext>
+  </p:extLst>
 </p:presentation>
 </file>
 
@@ -6529,6 +6535,145 @@
           <p:cNvPr id="2" name="Título 1">
             <a:extLst>
               <a:ext uri="{FF2B5EF4-FFF2-40B4-BE49-F238E27FC236}">
+                <a16:creationId xmlns:a16="http://schemas.microsoft.com/office/drawing/2014/main" id="{1EDF1DBD-FEAF-4673-8DB9-6733E4857D3D}"/>
+              </a:ext>
+            </a:extLst>
+          </p:cNvPr>
+          <p:cNvSpPr>
+            <a:spLocks noGrp="1"/>
+          </p:cNvSpPr>
+          <p:nvPr>
+            <p:ph type="title"/>
+          </p:nvPr>
+        </p:nvSpPr>
+        <p:spPr/>
+        <p:txBody>
+          <a:bodyPr/>
+          <a:lstStyle/>
+          <a:p>
+            <a:r>
+              <a:rPr lang="pt-BR" dirty="0"/>
+              <a:t>Lições Aprendidas</a:t>
+            </a:r>
+          </a:p>
+        </p:txBody>
+      </p:sp>
+      <p:sp>
+        <p:nvSpPr>
+          <p:cNvPr id="3" name="Espaço Reservado para Conteúdo 2">
+            <a:extLst>
+              <a:ext uri="{FF2B5EF4-FFF2-40B4-BE49-F238E27FC236}">
+                <a16:creationId xmlns:a16="http://schemas.microsoft.com/office/drawing/2014/main" id="{180F5145-BCDE-4D0E-BEDF-51D069FE1B8B}"/>
+              </a:ext>
+            </a:extLst>
+          </p:cNvPr>
+          <p:cNvSpPr>
+            <a:spLocks noGrp="1"/>
+          </p:cNvSpPr>
+          <p:nvPr>
+            <p:ph sz="quarter" idx="13"/>
+          </p:nvPr>
+        </p:nvSpPr>
+        <p:spPr>
+          <a:xfrm>
+            <a:off x="913775" y="1744240"/>
+            <a:ext cx="10363826" cy="4510786"/>
+          </a:xfrm>
+        </p:spPr>
+        <p:txBody>
+          <a:bodyPr>
+            <a:noAutofit/>
+          </a:bodyPr>
+          <a:lstStyle/>
+          <a:p>
+            <a:r>
+              <a:rPr lang="pt-BR" sz="1700" dirty="0"/>
+              <a:t>Precisamos ter um planejamento correto senão ocorre falta de algumas entregas (no meu caso os relatórios).</a:t>
+            </a:r>
+          </a:p>
+          <a:p>
+            <a:r>
+              <a:rPr lang="pt-BR" sz="1700" dirty="0"/>
+              <a:t>A tecnologia adotada me permitiu fazer muitas coisas e gostaria de ter adotado também uma tecnologia WEB que me permitisse ter uma plataforma mais flexível.</a:t>
+            </a:r>
+          </a:p>
+          <a:p>
+            <a:r>
+              <a:rPr lang="pt-BR" sz="1700" dirty="0"/>
+              <a:t>O case foi validado e aprovado por pequenas e medias empresa de malharias de </a:t>
+            </a:r>
+            <a:r>
+              <a:rPr lang="pt-BR" sz="1700" dirty="0" err="1"/>
+              <a:t>gaspar</a:t>
+            </a:r>
+            <a:r>
+              <a:rPr lang="pt-BR" sz="1700" dirty="0"/>
+              <a:t> o qual foi recolhido feedback de melhorias futuras.</a:t>
+            </a:r>
+          </a:p>
+          <a:p>
+            <a:r>
+              <a:rPr lang="pt-BR" sz="1700" dirty="0"/>
+              <a:t>A gestão do projeto é de suma importância e sem isso não é possível fazer um bom trabalho.</a:t>
+            </a:r>
+          </a:p>
+          <a:p>
+            <a:r>
+              <a:rPr lang="pt-BR" sz="1700" dirty="0"/>
+              <a:t>Se o projeto iniciasse hoje iria solicitar 12 meses a mais, sendo necessário 2 meses de entrevistas e estudos, 8 meses de estudos e 2 meses de piloto nos clientes. Usaria </a:t>
+            </a:r>
+            <a:r>
+              <a:rPr lang="pt-BR" sz="1700" dirty="0" err="1"/>
+              <a:t>AsPNET</a:t>
+            </a:r>
+            <a:r>
+              <a:rPr lang="pt-BR" sz="1700" dirty="0"/>
+              <a:t> e/ou Outra linguagem WEB.</a:t>
+            </a:r>
+          </a:p>
+          <a:p>
+            <a:r>
+              <a:rPr lang="pt-BR" sz="1700" dirty="0"/>
+              <a:t>O Custo envolvido seria um adicional de R$16.500,00 entre remuneração e melhorias na estrutura(Máquinas e livros por exemplo.</a:t>
+            </a:r>
+          </a:p>
+        </p:txBody>
+      </p:sp>
+    </p:spTree>
+    <p:extLst>
+      <p:ext uri="{BB962C8B-B14F-4D97-AF65-F5344CB8AC3E}">
+        <p14:creationId xmlns:p14="http://schemas.microsoft.com/office/powerpoint/2010/main" val="1821290355"/>
+      </p:ext>
+    </p:extLst>
+  </p:cSld>
+  <p:clrMapOvr>
+    <a:masterClrMapping/>
+  </p:clrMapOvr>
+</p:sld>
+</file>
+
+<file path=ppt/slides/slide5.xml><?xml version="1.0" encoding="utf-8"?>
+<p:sld xmlns:a="http://schemas.openxmlformats.org/drawingml/2006/main" xmlns:r="http://schemas.openxmlformats.org/officeDocument/2006/relationships" xmlns:p="http://schemas.openxmlformats.org/presentationml/2006/main">
+  <p:cSld>
+    <p:spTree>
+      <p:nvGrpSpPr>
+        <p:cNvPr id="1" name=""/>
+        <p:cNvGrpSpPr/>
+        <p:nvPr/>
+      </p:nvGrpSpPr>
+      <p:grpSpPr>
+        <a:xfrm>
+          <a:off x="0" y="0"/>
+          <a:ext cx="0" cy="0"/>
+          <a:chOff x="0" y="0"/>
+          <a:chExt cx="0" cy="0"/>
+        </a:xfrm>
+      </p:grpSpPr>
+      <p:sp>
+        <p:nvSpPr>
+          <p:cNvPr id="2" name="Título 1">
+            <a:extLst>
+              <a:ext uri="{FF2B5EF4-FFF2-40B4-BE49-F238E27FC236}">
                 <a16:creationId xmlns:a16="http://schemas.microsoft.com/office/drawing/2014/main" id="{1C1FD19A-5FE4-404A-8702-F70E26CDE80D}"/>
               </a:ext>
             </a:extLst>

</xml_diff>